<commit_message>
First version of Wakanda
</commit_message>
<xml_diff>
--- a/1x - Nodejs [RC without Labs].pptx
+++ b/1x - Nodejs [RC without Labs].pptx
@@ -322,7 +322,7 @@
               <a:pPr>
                 <a:defRPr/>
               </a:pPr>
-              <a:t>2013-02-27</a:t>
+              <a:t>3/19/13</a:t>
             </a:fld>
             <a:endParaRPr lang="en-US"/>
           </a:p>
@@ -581,7 +581,7 @@
               <a:pPr>
                 <a:defRPr/>
               </a:pPr>
-              <a:t>2013-02-27</a:t>
+              <a:t>3/19/13</a:t>
             </a:fld>
             <a:endParaRPr lang="en-US"/>
           </a:p>
@@ -984,6 +984,429 @@
               <a:spcBef>
                 <a:spcPct val="0"/>
               </a:spcBef>
+              <a:defRPr/>
+            </a:pPr>
+            <a:r>
+              <a:rPr lang="fr-FR" b="1" dirty="0" smtClean="0">
+                <a:ea typeface="ＭＳ Ｐゴシック" charset="0"/>
+                <a:cs typeface="ＭＳ Ｐゴシック" charset="0"/>
+              </a:rPr>
+              <a:t>© SUPINFO International </a:t>
+            </a:r>
+            <a:r>
+              <a:rPr lang="fr-FR" b="1" dirty="0" err="1" smtClean="0">
+                <a:ea typeface="ＭＳ Ｐゴシック" charset="0"/>
+                <a:cs typeface="ＭＳ Ｐゴシック" charset="0"/>
+              </a:rPr>
+              <a:t>University</a:t>
+            </a:r>
+            <a:r>
+              <a:rPr lang="fr-FR" b="1" dirty="0" smtClean="0">
+                <a:ea typeface="ＭＳ Ｐゴシック" charset="0"/>
+                <a:cs typeface="ＭＳ Ｐゴシック" charset="0"/>
+              </a:rPr>
+              <a:t> </a:t>
+            </a:r>
+            <a:r>
+              <a:rPr lang="fr-FR" dirty="0" smtClean="0">
+                <a:ea typeface="ＭＳ Ｐゴシック" charset="0"/>
+                <a:cs typeface="ＭＳ Ｐゴシック" charset="0"/>
+              </a:rPr>
+              <a:t>- http://</a:t>
+            </a:r>
+            <a:r>
+              <a:rPr lang="fr-FR" dirty="0" err="1" smtClean="0">
+                <a:ea typeface="ＭＳ Ｐゴシック" charset="0"/>
+                <a:cs typeface="ＭＳ Ｐゴシック" charset="0"/>
+              </a:rPr>
+              <a:t>www.supinfo.com</a:t>
+            </a:r>
+            <a:endParaRPr lang="fr-FR" dirty="0" smtClean="0">
+              <a:ea typeface="ＭＳ Ｐゴシック" charset="0"/>
+              <a:cs typeface="ＭＳ Ｐゴシック" charset="0"/>
+            </a:endParaRPr>
+          </a:p>
+          <a:p>
+            <a:pPr defTabSz="461963" eaLnBrk="1" hangingPunct="1">
+              <a:spcBef>
+                <a:spcPct val="0"/>
+              </a:spcBef>
+              <a:defRPr/>
+            </a:pPr>
+            <a:endParaRPr lang="fr-FR" i="1" dirty="0" smtClean="0">
+              <a:ea typeface="ＭＳ Ｐゴシック" charset="0"/>
+              <a:cs typeface="ＭＳ Ｐゴシック" charset="0"/>
+            </a:endParaRPr>
+          </a:p>
+          <a:p>
+            <a:pPr defTabSz="461963" eaLnBrk="1" hangingPunct="1">
+              <a:spcBef>
+                <a:spcPct val="0"/>
+              </a:spcBef>
+              <a:defRPr/>
+            </a:pPr>
+            <a:r>
+              <a:rPr lang="fr-FR" i="1" dirty="0" smtClean="0">
+                <a:ea typeface="ＭＳ Ｐゴシック" charset="0"/>
+                <a:cs typeface="ＭＳ Ｐゴシック" charset="0"/>
+              </a:rPr>
+              <a:t>SUPINFO vous permet de partager ce document</a:t>
+            </a:r>
+          </a:p>
+          <a:p>
+            <a:pPr defTabSz="461963" eaLnBrk="1" hangingPunct="1">
+              <a:spcBef>
+                <a:spcPct val="0"/>
+              </a:spcBef>
+              <a:defRPr/>
+            </a:pPr>
+            <a:endParaRPr lang="fr-FR" i="1" dirty="0" smtClean="0">
+              <a:ea typeface="ＭＳ Ｐゴシック" charset="0"/>
+              <a:cs typeface="ＭＳ Ｐゴシック" charset="0"/>
+            </a:endParaRPr>
+          </a:p>
+          <a:p>
+            <a:pPr defTabSz="461963" eaLnBrk="1" hangingPunct="1">
+              <a:spcBef>
+                <a:spcPct val="0"/>
+              </a:spcBef>
+              <a:defRPr/>
+            </a:pPr>
+            <a:r>
+              <a:rPr lang="fr-FR" i="1" dirty="0" smtClean="0">
+                <a:ea typeface="ＭＳ Ｐゴシック" charset="0"/>
+                <a:cs typeface="ＭＳ Ｐゴシック" charset="0"/>
+              </a:rPr>
+              <a:t>Vous êtes libre de :</a:t>
+            </a:r>
+          </a:p>
+          <a:p>
+            <a:pPr defTabSz="461963" eaLnBrk="1" hangingPunct="1">
+              <a:spcBef>
+                <a:spcPct val="0"/>
+              </a:spcBef>
+              <a:defRPr/>
+            </a:pPr>
+            <a:r>
+              <a:rPr lang="fr-FR" i="1" dirty="0" smtClean="0">
+                <a:ea typeface="ＭＳ Ｐゴシック" charset="0"/>
+                <a:cs typeface="ＭＳ Ｐゴシック" charset="0"/>
+              </a:rPr>
+              <a:t>Partager — reproduire, distribuer et communiquer ce document</a:t>
+            </a:r>
+            <a:br>
+              <a:rPr lang="fr-FR" i="1" dirty="0" smtClean="0">
+                <a:ea typeface="ＭＳ Ｐゴシック" charset="0"/>
+                <a:cs typeface="ＭＳ Ｐゴシック" charset="0"/>
+              </a:rPr>
+            </a:br>
+            <a:r>
+              <a:rPr lang="fr-FR" i="1" dirty="0" smtClean="0">
+                <a:ea typeface="ＭＳ Ｐゴシック" charset="0"/>
+                <a:cs typeface="ＭＳ Ｐゴシック" charset="0"/>
+              </a:rPr>
+              <a:t>Remixer — modifier ce document</a:t>
+            </a:r>
+          </a:p>
+          <a:p>
+            <a:pPr defTabSz="461963" eaLnBrk="1" hangingPunct="1">
+              <a:spcBef>
+                <a:spcPct val="0"/>
+              </a:spcBef>
+              <a:defRPr/>
+            </a:pPr>
+            <a:endParaRPr lang="fr-FR" i="1" dirty="0" smtClean="0">
+              <a:ea typeface="ＭＳ Ｐゴシック" charset="0"/>
+              <a:cs typeface="ＭＳ Ｐゴシック" charset="0"/>
+            </a:endParaRPr>
+          </a:p>
+          <a:p>
+            <a:pPr marL="171450" indent="-171450" defTabSz="461963" eaLnBrk="1" hangingPunct="1">
+              <a:spcBef>
+                <a:spcPct val="0"/>
+              </a:spcBef>
+              <a:buFont typeface="Arial"/>
+              <a:buChar char="•"/>
+              <a:defRPr/>
+            </a:pPr>
+            <a:r>
+              <a:rPr lang="fr-FR" i="1" dirty="0" smtClean="0">
+                <a:ea typeface="ＭＳ Ｐゴシック" charset="0"/>
+                <a:cs typeface="ＭＳ Ｐゴシック" charset="0"/>
+              </a:rPr>
+              <a:t>A condition de respecter les règles suivantes :</a:t>
+            </a:r>
+          </a:p>
+          <a:p>
+            <a:pPr marL="628650" lvl="1" indent="-171450" defTabSz="461963" eaLnBrk="1" hangingPunct="1">
+              <a:spcBef>
+                <a:spcPct val="0"/>
+              </a:spcBef>
+              <a:buFont typeface="Arial"/>
+              <a:buChar char="•"/>
+              <a:defRPr/>
+            </a:pPr>
+            <a:r>
+              <a:rPr lang="fr-FR" i="1" dirty="0" smtClean="0">
+                <a:ea typeface="ＭＳ Ｐゴシック" charset="0"/>
+                <a:cs typeface="ＭＳ Ｐゴシック" charset="0"/>
+              </a:rPr>
+              <a:t>Indication obligatoire de la paternité — Vous devez obligatoirement préciser l’origine « SUPINFO » du document au début de celui-ci de la même manière qu’indiqué par SUPINFO International </a:t>
+            </a:r>
+            <a:r>
+              <a:rPr lang="fr-FR" i="1" dirty="0" err="1" smtClean="0">
+                <a:ea typeface="ＭＳ Ｐゴシック" charset="0"/>
+                <a:cs typeface="ＭＳ Ｐゴシック" charset="0"/>
+              </a:rPr>
+              <a:t>University</a:t>
+            </a:r>
+            <a:r>
+              <a:rPr lang="fr-FR" i="1" dirty="0" smtClean="0">
+                <a:ea typeface="ＭＳ Ｐゴシック" charset="0"/>
+                <a:cs typeface="ＭＳ Ｐゴシック" charset="0"/>
+              </a:rPr>
+              <a:t> – Notamment en laissant obligatoirement la première et la dernière page du document, mais pas d'une manière qui suggérerait que SUPINFO International </a:t>
+            </a:r>
+            <a:r>
+              <a:rPr lang="fr-FR" i="1" dirty="0" err="1" smtClean="0">
+                <a:ea typeface="ＭＳ Ｐゴシック" charset="0"/>
+                <a:cs typeface="ＭＳ Ｐゴシック" charset="0"/>
+              </a:rPr>
+              <a:t>University</a:t>
+            </a:r>
+            <a:r>
+              <a:rPr lang="fr-FR" i="1" dirty="0" smtClean="0">
+                <a:ea typeface="ＭＳ Ｐゴシック" charset="0"/>
+                <a:cs typeface="ＭＳ Ｐゴシック" charset="0"/>
+              </a:rPr>
+              <a:t> vous soutiennent ou approuvent votre utilisation du document, surtout si vous le modifiez. Dans ce dernier cas, il vous faudra obligatoirement supprimer le texte « SUPINFO Official Document » en tête de page et préciser notamment la page indiquant votre identité et les modifications principales apportées. </a:t>
+            </a:r>
+          </a:p>
+          <a:p>
+            <a:pPr marL="628650" lvl="1" indent="-171450" defTabSz="461963" eaLnBrk="1" hangingPunct="1">
+              <a:spcBef>
+                <a:spcPct val="0"/>
+              </a:spcBef>
+              <a:buFont typeface="Arial"/>
+              <a:buChar char="•"/>
+              <a:defRPr/>
+            </a:pPr>
+            <a:r>
+              <a:rPr lang="fr-FR" i="1" dirty="0" smtClean="0">
+                <a:ea typeface="ＭＳ Ｐゴシック" charset="0"/>
+                <a:cs typeface="ＭＳ Ｐゴシック" charset="0"/>
+              </a:rPr>
+              <a:t>En dehors de ces dispositions, aucune autre modification de la première et de la dernière page du document n’est autorisée.</a:t>
+            </a:r>
+          </a:p>
+          <a:p>
+            <a:pPr defTabSz="461963" eaLnBrk="1" hangingPunct="1">
+              <a:spcBef>
+                <a:spcPct val="0"/>
+              </a:spcBef>
+              <a:defRPr/>
+            </a:pPr>
+            <a:endParaRPr lang="fr-FR" i="1" dirty="0" smtClean="0">
+              <a:ea typeface="ＭＳ Ｐゴシック" charset="0"/>
+              <a:cs typeface="ＭＳ Ｐゴシック" charset="0"/>
+            </a:endParaRPr>
+          </a:p>
+          <a:p>
+            <a:pPr defTabSz="461963" eaLnBrk="1" hangingPunct="1">
+              <a:spcBef>
+                <a:spcPct val="0"/>
+              </a:spcBef>
+              <a:defRPr/>
+            </a:pPr>
+            <a:endParaRPr lang="fr-FR" i="1" dirty="0" smtClean="0">
+              <a:ea typeface="ＭＳ Ｐゴシック" charset="0"/>
+              <a:cs typeface="ＭＳ Ｐゴシック" charset="0"/>
+            </a:endParaRPr>
+          </a:p>
+          <a:p>
+            <a:pPr defTabSz="461963" eaLnBrk="1" hangingPunct="1">
+              <a:spcBef>
+                <a:spcPct val="0"/>
+              </a:spcBef>
+              <a:defRPr/>
+            </a:pPr>
+            <a:r>
+              <a:rPr lang="fr-FR" i="1" dirty="0" smtClean="0">
+                <a:ea typeface="ＭＳ Ｐゴシック" charset="0"/>
+                <a:cs typeface="ＭＳ Ｐゴシック" charset="0"/>
+              </a:rPr>
+              <a:t>NOTE IMPORTANTE : Ce document est mis à disposition selon le contrat CC-BY-NC-SA </a:t>
+            </a:r>
+            <a:r>
+              <a:rPr lang="fr-FR" i="1" dirty="0" err="1" smtClean="0">
+                <a:ea typeface="ＭＳ Ｐゴシック" charset="0"/>
+                <a:cs typeface="ＭＳ Ｐゴシック" charset="0"/>
+              </a:rPr>
+              <a:t>Creative</a:t>
+            </a:r>
+            <a:r>
+              <a:rPr lang="fr-FR" i="1" dirty="0" smtClean="0">
+                <a:ea typeface="ＭＳ Ｐゴシック" charset="0"/>
+                <a:cs typeface="ＭＳ Ｐゴシック" charset="0"/>
+              </a:rPr>
+              <a:t> Commons disponible en ligne http://</a:t>
+            </a:r>
+            <a:r>
+              <a:rPr lang="fr-FR" i="1" dirty="0" err="1" smtClean="0">
+                <a:ea typeface="ＭＳ Ｐゴシック" charset="0"/>
+                <a:cs typeface="ＭＳ Ｐゴシック" charset="0"/>
+              </a:rPr>
+              <a:t>creativecommons.org</a:t>
+            </a:r>
+            <a:r>
+              <a:rPr lang="fr-FR" i="1" dirty="0" smtClean="0">
+                <a:ea typeface="ＭＳ Ｐゴシック" charset="0"/>
+                <a:cs typeface="ＭＳ Ｐゴシック" charset="0"/>
+              </a:rPr>
+              <a:t>/</a:t>
+            </a:r>
+            <a:r>
+              <a:rPr lang="fr-FR" i="1" dirty="0" err="1" smtClean="0">
+                <a:ea typeface="ＭＳ Ｐゴシック" charset="0"/>
+                <a:cs typeface="ＭＳ Ｐゴシック" charset="0"/>
+              </a:rPr>
+              <a:t>licenses</a:t>
+            </a:r>
+            <a:r>
+              <a:rPr lang="fr-FR" i="1" dirty="0" smtClean="0">
+                <a:ea typeface="ＭＳ Ｐゴシック" charset="0"/>
+                <a:cs typeface="ＭＳ Ｐゴシック" charset="0"/>
+              </a:rPr>
+              <a:t> ou par courrier postal à </a:t>
+            </a:r>
+            <a:r>
+              <a:rPr lang="fr-FR" i="1" dirty="0" err="1" smtClean="0">
+                <a:ea typeface="ＭＳ Ｐゴシック" charset="0"/>
+                <a:cs typeface="ＭＳ Ｐゴシック" charset="0"/>
+              </a:rPr>
+              <a:t>Creative</a:t>
+            </a:r>
+            <a:r>
+              <a:rPr lang="fr-FR" i="1" dirty="0" smtClean="0">
+                <a:ea typeface="ＭＳ Ｐゴシック" charset="0"/>
+                <a:cs typeface="ＭＳ Ｐゴシック" charset="0"/>
+              </a:rPr>
+              <a:t> Commons, 171 Second Street, Suite 300, San Francisco, </a:t>
+            </a:r>
+            <a:r>
+              <a:rPr lang="fr-FR" i="1" dirty="0" err="1" smtClean="0">
+                <a:ea typeface="ＭＳ Ｐゴシック" charset="0"/>
+                <a:cs typeface="ＭＳ Ｐゴシック" charset="0"/>
+              </a:rPr>
+              <a:t>California</a:t>
+            </a:r>
+            <a:r>
+              <a:rPr lang="fr-FR" i="1" dirty="0" smtClean="0">
+                <a:ea typeface="ＭＳ Ｐゴシック" charset="0"/>
+                <a:cs typeface="ＭＳ Ｐゴシック" charset="0"/>
+              </a:rPr>
+              <a:t> 94105, USA modifié en ce sens que la première et la dernière page du document ne peuvent être supprimées en cas de reproduction, distribution, communication ou modification. Vous pouvez donc reproduire, remixer, arranger et adapter ce document à des fins non commerciales tant que vous respectez les règles de paternité et que les nouveaux documents sont protégés selon des termes identiques. Les autorisations au-delà du champ de cette licence peuvent être obtenues à </a:t>
+            </a:r>
+            <a:r>
+              <a:rPr lang="fr-FR" i="1" dirty="0" err="1" smtClean="0">
+                <a:ea typeface="ＭＳ Ｐゴシック" charset="0"/>
+                <a:cs typeface="ＭＳ Ｐゴシック" charset="0"/>
+              </a:rPr>
+              <a:t>support@supinfo.com</a:t>
+            </a:r>
+            <a:r>
+              <a:rPr lang="fr-FR" i="1" dirty="0" smtClean="0">
+                <a:ea typeface="ＭＳ Ｐゴシック" charset="0"/>
+                <a:cs typeface="ＭＳ Ｐゴシック" charset="0"/>
+              </a:rPr>
+              <a:t>.</a:t>
+            </a:r>
+          </a:p>
+          <a:p>
+            <a:pPr defTabSz="461963" eaLnBrk="1" hangingPunct="1">
+              <a:spcBef>
+                <a:spcPct val="0"/>
+              </a:spcBef>
+              <a:defRPr/>
+            </a:pPr>
+            <a:endParaRPr lang="fr-FR" i="1" dirty="0" smtClean="0">
+              <a:ea typeface="ＭＳ Ｐゴシック" charset="0"/>
+              <a:cs typeface="ＭＳ Ｐゴシック" charset="0"/>
+            </a:endParaRPr>
+          </a:p>
+          <a:p>
+            <a:pPr defTabSz="461963" eaLnBrk="1" hangingPunct="1">
+              <a:spcBef>
+                <a:spcPct val="0"/>
+              </a:spcBef>
+              <a:defRPr/>
+            </a:pPr>
+            <a:r>
+              <a:rPr lang="fr-FR" i="1" dirty="0" smtClean="0">
+                <a:ea typeface="ＭＳ Ｐゴシック" charset="0"/>
+                <a:cs typeface="ＭＳ Ｐゴシック" charset="0"/>
+              </a:rPr>
+              <a:t>© SUPINFO International </a:t>
+            </a:r>
+            <a:r>
+              <a:rPr lang="fr-FR" i="1" dirty="0" err="1" smtClean="0">
+                <a:ea typeface="ＭＳ Ｐゴシック" charset="0"/>
+                <a:cs typeface="ＭＳ Ｐゴシック" charset="0"/>
+              </a:rPr>
+              <a:t>University</a:t>
+            </a:r>
+            <a:r>
+              <a:rPr lang="fr-FR" i="1" dirty="0" smtClean="0">
+                <a:ea typeface="ＭＳ Ｐゴシック" charset="0"/>
+                <a:cs typeface="ＭＳ Ｐゴシック" charset="0"/>
+              </a:rPr>
+              <a:t> – EDUCINVEST - Rue Ducale, 29 - 1000 Brussels </a:t>
+            </a:r>
+            <a:r>
+              <a:rPr lang="fr-FR" i="1" dirty="0" err="1" smtClean="0">
+                <a:ea typeface="ＭＳ Ｐゴシック" charset="0"/>
+                <a:cs typeface="ＭＳ Ｐゴシック" charset="0"/>
+              </a:rPr>
+              <a:t>Belgium</a:t>
+            </a:r>
+            <a:r>
+              <a:rPr lang="fr-FR" i="1" dirty="0" smtClean="0">
+                <a:ea typeface="ＭＳ Ｐゴシック" charset="0"/>
+                <a:cs typeface="ＭＳ Ｐゴシック" charset="0"/>
+              </a:rPr>
+              <a:t> . </a:t>
+            </a:r>
+            <a:r>
+              <a:rPr lang="fr-FR" i="1" dirty="0" err="1" smtClean="0">
+                <a:ea typeface="ＭＳ Ｐゴシック" charset="0"/>
+                <a:cs typeface="ＭＳ Ｐゴシック" charset="0"/>
+              </a:rPr>
+              <a:t>www.supinfo.com</a:t>
+            </a:r>
+            <a:r>
+              <a:rPr lang="fr-FR" i="1" dirty="0" smtClean="0">
+                <a:ea typeface="ＭＳ Ｐゴシック" charset="0"/>
+                <a:cs typeface="ＭＳ Ｐゴシック" charset="0"/>
+              </a:rPr>
+              <a:t> </a:t>
+            </a:r>
+          </a:p>
+          <a:p>
+            <a:pPr defTabSz="461963" eaLnBrk="1" hangingPunct="1">
+              <a:spcBef>
+                <a:spcPct val="0"/>
+              </a:spcBef>
+            </a:pPr>
+            <a:endParaRPr lang="fr-FR" smtClean="0">
+              <a:latin typeface="Arial" pitchFamily="34" charset="0"/>
+              <a:ea typeface="ＭＳ Ｐゴシック" pitchFamily="34" charset="-128"/>
+            </a:endParaRPr>
+          </a:p>
+          <a:p>
+            <a:pPr defTabSz="461963" eaLnBrk="1" hangingPunct="1">
+              <a:spcBef>
+                <a:spcPct val="0"/>
+              </a:spcBef>
             </a:pPr>
             <a:endParaRPr lang="fr-FR" smtClean="0">
               <a:latin typeface="Arial" pitchFamily="34" charset="0"/>
@@ -1151,7 +1574,7 @@
               <a:pPr>
                 <a:defRPr/>
               </a:pPr>
-              <a:t>2013-02-27</a:t>
+              <a:t>3/19/13</a:t>
             </a:fld>
             <a:endParaRPr lang="en-US"/>
           </a:p>
@@ -1322,7 +1745,7 @@
               <a:pPr>
                 <a:defRPr/>
               </a:pPr>
-              <a:t>2013-02-27</a:t>
+              <a:t>3/19/13</a:t>
             </a:fld>
             <a:endParaRPr lang="en-US"/>
           </a:p>
@@ -1493,7 +1916,7 @@
               <a:pPr>
                 <a:defRPr/>
               </a:pPr>
-              <a:t>2013-02-27</a:t>
+              <a:t>3/19/13</a:t>
             </a:fld>
             <a:endParaRPr lang="en-US"/>
           </a:p>
@@ -1664,7 +2087,7 @@
               <a:pPr>
                 <a:defRPr/>
               </a:pPr>
-              <a:t>2013-02-27</a:t>
+              <a:t>3/19/13</a:t>
             </a:fld>
             <a:endParaRPr lang="en-US"/>
           </a:p>
@@ -1835,7 +2258,7 @@
               <a:pPr>
                 <a:defRPr/>
               </a:pPr>
-              <a:t>2013-02-27</a:t>
+              <a:t>3/19/13</a:t>
             </a:fld>
             <a:endParaRPr lang="en-US"/>
           </a:p>
@@ -2006,7 +2429,7 @@
               <a:pPr>
                 <a:defRPr/>
               </a:pPr>
-              <a:t>2013-02-27</a:t>
+              <a:t>3/19/13</a:t>
             </a:fld>
             <a:endParaRPr lang="en-US"/>
           </a:p>
@@ -2177,7 +2600,7 @@
               <a:pPr>
                 <a:defRPr/>
               </a:pPr>
-              <a:t>2013-02-27</a:t>
+              <a:t>3/19/13</a:t>
             </a:fld>
             <a:endParaRPr lang="en-US"/>
           </a:p>
@@ -2348,7 +2771,7 @@
               <a:pPr>
                 <a:defRPr/>
               </a:pPr>
-              <a:t>2013-02-27</a:t>
+              <a:t>3/19/13</a:t>
             </a:fld>
             <a:endParaRPr lang="en-US"/>
           </a:p>
@@ -2519,7 +2942,7 @@
               <a:pPr>
                 <a:defRPr/>
               </a:pPr>
-              <a:t>2013-02-27</a:t>
+              <a:t>3/19/13</a:t>
             </a:fld>
             <a:endParaRPr lang="en-US"/>
           </a:p>
@@ -2690,7 +3113,7 @@
               <a:pPr>
                 <a:defRPr/>
               </a:pPr>
-              <a:t>2013-02-27</a:t>
+              <a:t>3/19/13</a:t>
             </a:fld>
             <a:endParaRPr lang="en-US"/>
           </a:p>
@@ -2861,7 +3284,7 @@
               <a:pPr>
                 <a:defRPr/>
               </a:pPr>
-              <a:t>2013-02-27</a:t>
+              <a:t>3/19/13</a:t>
             </a:fld>
             <a:endParaRPr lang="en-US"/>
           </a:p>
@@ -3032,7 +3455,7 @@
               <a:pPr>
                 <a:defRPr/>
               </a:pPr>
-              <a:t>2013-02-27</a:t>
+              <a:t>3/19/13</a:t>
             </a:fld>
             <a:endParaRPr lang="en-US"/>
           </a:p>
@@ -3203,7 +3626,7 @@
               <a:pPr>
                 <a:defRPr/>
               </a:pPr>
-              <a:t>2013-02-27</a:t>
+              <a:t>3/19/13</a:t>
             </a:fld>
             <a:endParaRPr lang="en-US"/>
           </a:p>
@@ -3374,7 +3797,7 @@
               <a:pPr>
                 <a:defRPr/>
               </a:pPr>
-              <a:t>2013-02-27</a:t>
+              <a:t>3/19/13</a:t>
             </a:fld>
             <a:endParaRPr lang="en-US"/>
           </a:p>
@@ -3545,7 +3968,7 @@
               <a:pPr>
                 <a:defRPr/>
               </a:pPr>
-              <a:t>2013-02-27</a:t>
+              <a:t>3/19/13</a:t>
             </a:fld>
             <a:endParaRPr lang="en-US"/>
           </a:p>
@@ -3716,7 +4139,7 @@
               <a:pPr>
                 <a:defRPr/>
               </a:pPr>
-              <a:t>2013-02-27</a:t>
+              <a:t>3/19/13</a:t>
             </a:fld>
             <a:endParaRPr lang="en-US"/>
           </a:p>
@@ -3887,7 +4310,7 @@
               <a:pPr>
                 <a:defRPr/>
               </a:pPr>
-              <a:t>2013-02-27</a:t>
+              <a:t>3/19/13</a:t>
             </a:fld>
             <a:endParaRPr lang="en-US"/>
           </a:p>
@@ -4070,7 +4493,7 @@
               <a:pPr>
                 <a:defRPr/>
               </a:pPr>
-              <a:t>2013-02-27</a:t>
+              <a:t>3/19/13</a:t>
             </a:fld>
             <a:endParaRPr lang="en-US"/>
           </a:p>
@@ -4241,7 +4664,7 @@
               <a:pPr>
                 <a:defRPr/>
               </a:pPr>
-              <a:t>2013-02-27</a:t>
+              <a:t>3/19/13</a:t>
             </a:fld>
             <a:endParaRPr lang="en-US"/>
           </a:p>
@@ -4424,7 +4847,7 @@
               <a:pPr>
                 <a:defRPr/>
               </a:pPr>
-              <a:t>2013-02-27</a:t>
+              <a:t>3/19/13</a:t>
             </a:fld>
             <a:endParaRPr lang="en-US"/>
           </a:p>
@@ -4607,7 +5030,7 @@
               <a:pPr>
                 <a:defRPr/>
               </a:pPr>
-              <a:t>2013-02-27</a:t>
+              <a:t>3/19/13</a:t>
             </a:fld>
             <a:endParaRPr lang="en-US"/>
           </a:p>
@@ -4778,7 +5201,7 @@
               <a:pPr>
                 <a:defRPr/>
               </a:pPr>
-              <a:t>2013-02-27</a:t>
+              <a:t>3/19/13</a:t>
             </a:fld>
             <a:endParaRPr lang="en-US"/>
           </a:p>
@@ -4961,7 +5384,7 @@
               <a:pPr>
                 <a:defRPr/>
               </a:pPr>
-              <a:t>2013-02-27</a:t>
+              <a:t>3/19/13</a:t>
             </a:fld>
             <a:endParaRPr lang="en-US"/>
           </a:p>
@@ -5144,7 +5567,7 @@
               <a:pPr>
                 <a:defRPr/>
               </a:pPr>
-              <a:t>2013-02-27</a:t>
+              <a:t>3/19/13</a:t>
             </a:fld>
             <a:endParaRPr lang="en-US"/>
           </a:p>
@@ -5327,7 +5750,7 @@
               <a:pPr>
                 <a:defRPr/>
               </a:pPr>
-              <a:t>2013-02-27</a:t>
+              <a:t>3/19/13</a:t>
             </a:fld>
             <a:endParaRPr lang="en-US"/>
           </a:p>
@@ -5510,7 +5933,7 @@
               <a:pPr>
                 <a:defRPr/>
               </a:pPr>
-              <a:t>2013-02-27</a:t>
+              <a:t>3/19/13</a:t>
             </a:fld>
             <a:endParaRPr lang="en-US"/>
           </a:p>
@@ -5681,7 +6104,7 @@
               <a:pPr>
                 <a:defRPr/>
               </a:pPr>
-              <a:t>2013-02-27</a:t>
+              <a:t>3/19/13</a:t>
             </a:fld>
             <a:endParaRPr lang="en-US"/>
           </a:p>
@@ -5852,7 +6275,7 @@
               <a:pPr>
                 <a:defRPr/>
               </a:pPr>
-              <a:t>2013-02-27</a:t>
+              <a:t>3/19/13</a:t>
             </a:fld>
             <a:endParaRPr lang="en-US"/>
           </a:p>
@@ -6023,7 +6446,7 @@
               <a:pPr>
                 <a:defRPr/>
               </a:pPr>
-              <a:t>2013-02-27</a:t>
+              <a:t>3/19/13</a:t>
             </a:fld>
             <a:endParaRPr lang="en-US"/>
           </a:p>
@@ -6194,7 +6617,7 @@
               <a:pPr>
                 <a:defRPr/>
               </a:pPr>
-              <a:t>2013-02-27</a:t>
+              <a:t>3/19/13</a:t>
             </a:fld>
             <a:endParaRPr lang="en-US"/>
           </a:p>
@@ -6365,7 +6788,7 @@
               <a:pPr>
                 <a:defRPr/>
               </a:pPr>
-              <a:t>2013-02-27</a:t>
+              <a:t>3/19/13</a:t>
             </a:fld>
             <a:endParaRPr lang="en-US"/>
           </a:p>
@@ -6536,7 +6959,7 @@
               <a:pPr>
                 <a:defRPr/>
               </a:pPr>
-              <a:t>2013-02-27</a:t>
+              <a:t>3/19/13</a:t>
             </a:fld>
             <a:endParaRPr lang="en-US"/>
           </a:p>
@@ -6813,7 +7236,7 @@
               <a:pPr>
                 <a:defRPr/>
               </a:pPr>
-              <a:t>2013-02-27</a:t>
+              <a:t>3/19/13</a:t>
             </a:fld>
             <a:endParaRPr lang="fr-FR"/>
           </a:p>
@@ -7044,7 +7467,7 @@
               <a:pPr>
                 <a:defRPr/>
               </a:pPr>
-              <a:t>2013-02-27</a:t>
+              <a:t>3/19/13</a:t>
             </a:fld>
             <a:endParaRPr lang="fr-FR"/>
           </a:p>
@@ -7285,7 +7708,7 @@
               <a:pPr>
                 <a:defRPr/>
               </a:pPr>
-              <a:t>2013-02-27</a:t>
+              <a:t>3/19/13</a:t>
             </a:fld>
             <a:endParaRPr lang="fr-FR"/>
           </a:p>
@@ -7549,7 +7972,7 @@
             <a:fld id="{29E81E79-DFAC-414F-9DD2-ED5820F0726F}" type="datetimeFigureOut">
               <a:rPr lang="fr-FR"/>
               <a:pPr/>
-              <a:t>2013-02-27</a:t>
+              <a:t>3/19/13</a:t>
             </a:fld>
             <a:endParaRPr lang="fr-FR"/>
           </a:p>
@@ -7772,7 +8195,7 @@
               <a:pPr>
                 <a:defRPr/>
               </a:pPr>
-              <a:t>2013-02-27</a:t>
+              <a:t>3/19/13</a:t>
             </a:fld>
             <a:endParaRPr lang="fr-FR"/>
           </a:p>
@@ -8079,7 +8502,7 @@
               <a:pPr>
                 <a:defRPr/>
               </a:pPr>
-              <a:t>2013-02-27</a:t>
+              <a:t>3/19/13</a:t>
             </a:fld>
             <a:endParaRPr lang="fr-FR"/>
           </a:p>
@@ -8428,7 +8851,7 @@
               <a:pPr>
                 <a:defRPr/>
               </a:pPr>
-              <a:t>2013-02-27</a:t>
+              <a:t>3/19/13</a:t>
             </a:fld>
             <a:endParaRPr lang="fr-FR"/>
           </a:p>
@@ -8911,7 +9334,7 @@
               <a:pPr>
                 <a:defRPr/>
               </a:pPr>
-              <a:t>2013-02-27</a:t>
+              <a:t>3/19/13</a:t>
             </a:fld>
             <a:endParaRPr lang="fr-FR"/>
           </a:p>
@@ -9090,7 +9513,7 @@
               <a:pPr>
                 <a:defRPr/>
               </a:pPr>
-              <a:t>2013-02-27</a:t>
+              <a:t>3/19/13</a:t>
             </a:fld>
             <a:endParaRPr lang="fr-FR"/>
           </a:p>
@@ -9246,7 +9669,7 @@
               <a:pPr>
                 <a:defRPr/>
               </a:pPr>
-              <a:t>2013-02-27</a:t>
+              <a:t>3/19/13</a:t>
             </a:fld>
             <a:endParaRPr lang="fr-FR"/>
           </a:p>
@@ -9584,7 +10007,7 @@
               <a:pPr>
                 <a:defRPr/>
               </a:pPr>
-              <a:t>2013-02-27</a:t>
+              <a:t>3/19/13</a:t>
             </a:fld>
             <a:endParaRPr lang="fr-FR"/>
           </a:p>
@@ -9905,7 +10328,7 @@
               <a:pPr>
                 <a:defRPr/>
               </a:pPr>
-              <a:t>2013-02-27</a:t>
+              <a:t>3/19/13</a:t>
             </a:fld>
             <a:endParaRPr lang="fr-FR"/>
           </a:p>
@@ -15533,7 +15956,37 @@
             <a:pPr lvl="1"/>
             <a:r>
               <a:rPr lang="en-US" dirty="0" smtClean="0"/>
-              <a:t>TODO</a:t>
+              <a:t>Explain what </a:t>
+            </a:r>
+            <a:r>
+              <a:rPr lang="en-US" dirty="0" err="1" smtClean="0"/>
+              <a:t>NodeJS</a:t>
+            </a:r>
+            <a:r>
+              <a:rPr lang="en-US" dirty="0" smtClean="0"/>
+              <a:t> is and what it’s not</a:t>
+            </a:r>
+          </a:p>
+          <a:p>
+            <a:pPr lvl="1"/>
+            <a:endParaRPr lang="en-US" dirty="0" smtClean="0"/>
+          </a:p>
+          <a:p>
+            <a:pPr lvl="1"/>
+            <a:r>
+              <a:rPr lang="en-US" dirty="0" smtClean="0"/>
+              <a:t>Use it to create a JavaScript server</a:t>
+            </a:r>
+          </a:p>
+          <a:p>
+            <a:pPr lvl="1"/>
+            <a:endParaRPr lang="en-US" smtClean="0"/>
+          </a:p>
+          <a:p>
+            <a:pPr lvl="1"/>
+            <a:r>
+              <a:rPr lang="en-US" dirty="0" smtClean="0"/>
+              <a:t>Develop a complete application</a:t>
             </a:r>
           </a:p>
         </p:txBody>
@@ -20931,14 +21384,38 @@
           </a:p>
           <a:p>
             <a:pPr lvl="1"/>
+            <a:r>
+              <a:rPr lang="en-US" dirty="0" smtClean="0"/>
+              <a:t>What is this node?</a:t>
+            </a:r>
+            <a:endParaRPr lang="en-US" dirty="0"/>
+          </a:p>
+          <a:p>
+            <a:pPr lvl="1"/>
+            <a:r>
+              <a:rPr lang="en-US" dirty="0" smtClean="0"/>
+              <a:t>TCP server</a:t>
+            </a:r>
+            <a:endParaRPr lang="en-US" dirty="0"/>
+          </a:p>
+          <a:p>
+            <a:pPr lvl="1"/>
+            <a:r>
+              <a:rPr lang="en-US" dirty="0" smtClean="0"/>
+              <a:t>Implementing a Web socket server</a:t>
+            </a:r>
+          </a:p>
+          <a:p>
+            <a:pPr lvl="1"/>
+            <a:r>
+              <a:rPr lang="en-US" dirty="0" smtClean="0"/>
+              <a:t>Develop a complete application with Express and </a:t>
+            </a:r>
+            <a:r>
+              <a:rPr lang="en-US" dirty="0" err="1" smtClean="0"/>
+              <a:t>MongoDB</a:t>
+            </a:r>
             <a:endParaRPr lang="en-US" dirty="0" smtClean="0"/>
-          </a:p>
-          <a:p>
-            <a:pPr lvl="1"/>
-            <a:r>
-              <a:rPr lang="en-US" dirty="0" smtClean="0"/>
-              <a:t>TODO</a:t>
-            </a:r>
           </a:p>
           <a:p>
             <a:pPr lvl="1"/>
@@ -25708,14 +26185,6 @@
               </a:rPr>
               <a:t>});</a:t>
             </a:r>
-            <a:endParaRPr lang="en-GB" b="1" dirty="0">
-              <a:solidFill>
-                <a:schemeClr val="tx1"/>
-              </a:solidFill>
-              <a:latin typeface="Courier New" pitchFamily="-106" charset="0"/>
-              <a:ea typeface="ＭＳ Ｐゴシック" pitchFamily="-106" charset="-128"/>
-              <a:cs typeface="Courier New" pitchFamily="-106" charset="0"/>
-            </a:endParaRPr>
           </a:p>
         </p:txBody>
       </p:sp>
@@ -25765,7 +26234,18 @@
                 <a:ea typeface="ＭＳ Ｐゴシック" pitchFamily="-106" charset="-128"/>
                 <a:cs typeface="Courier New" pitchFamily="-106" charset="0"/>
               </a:rPr>
-              <a:t>&lt;</a:t>
+              <a:t>&lt;script </a:t>
+            </a:r>
+            <a:r>
+              <a:rPr lang="en-GB" b="1" dirty="0" err="1">
+                <a:solidFill>
+                  <a:schemeClr val="tx1"/>
+                </a:solidFill>
+                <a:latin typeface="Courier New" pitchFamily="-106" charset="0"/>
+                <a:ea typeface="ＭＳ Ｐゴシック" pitchFamily="-106" charset="-128"/>
+                <a:cs typeface="Courier New" pitchFamily="-106" charset="0"/>
+              </a:rPr>
+              <a:t>src</a:t>
             </a:r>
             <a:r>
               <a:rPr lang="en-GB" b="1" dirty="0">
@@ -25776,109 +26256,54 @@
                 <a:ea typeface="ＭＳ Ｐゴシック" pitchFamily="-106" charset="-128"/>
                 <a:cs typeface="Courier New" pitchFamily="-106" charset="0"/>
               </a:rPr>
-              <a:t>script</a:t>
+              <a:t>="</a:t>
             </a:r>
             <a:r>
               <a:rPr lang="en-GB" b="1" dirty="0">
                 <a:solidFill>
+                  <a:srgbClr val="00B050"/>
+                </a:solidFill>
+                <a:latin typeface="Courier New" pitchFamily="1" charset="0"/>
+              </a:rPr>
+              <a:t>/</a:t>
+            </a:r>
+            <a:r>
+              <a:rPr lang="en-GB" b="1" dirty="0" err="1">
+                <a:solidFill>
+                  <a:srgbClr val="00B050"/>
+                </a:solidFill>
+                <a:latin typeface="Courier New" pitchFamily="1" charset="0"/>
+              </a:rPr>
+              <a:t>socket.io</a:t>
+            </a:r>
+            <a:r>
+              <a:rPr lang="en-GB" b="1" dirty="0">
+                <a:solidFill>
+                  <a:srgbClr val="00B050"/>
+                </a:solidFill>
+                <a:latin typeface="Courier New" pitchFamily="1" charset="0"/>
+              </a:rPr>
+              <a:t>/</a:t>
+            </a:r>
+            <a:r>
+              <a:rPr lang="en-GB" b="1" dirty="0" err="1">
+                <a:solidFill>
+                  <a:srgbClr val="00B050"/>
+                </a:solidFill>
+                <a:latin typeface="Courier New" pitchFamily="1" charset="0"/>
+              </a:rPr>
+              <a:t>socket.io.js</a:t>
+            </a:r>
+            <a:r>
+              <a:rPr lang="en-GB" b="1" dirty="0">
+                <a:solidFill>
                   <a:schemeClr val="tx1"/>
                 </a:solidFill>
                 <a:latin typeface="Courier New" pitchFamily="-106" charset="0"/>
                 <a:ea typeface="ＭＳ Ｐゴシック" pitchFamily="-106" charset="-128"/>
                 <a:cs typeface="Courier New" pitchFamily="-106" charset="0"/>
               </a:rPr>
-              <a:t> </a:t>
-            </a:r>
-            <a:r>
-              <a:rPr lang="en-GB" b="1" dirty="0" err="1">
-                <a:solidFill>
-                  <a:schemeClr val="tx1"/>
-                </a:solidFill>
-                <a:latin typeface="Courier New" pitchFamily="-106" charset="0"/>
-                <a:ea typeface="ＭＳ Ｐゴシック" pitchFamily="-106" charset="-128"/>
-                <a:cs typeface="Courier New" pitchFamily="-106" charset="0"/>
-              </a:rPr>
-              <a:t>src</a:t>
-            </a:r>
-            <a:r>
-              <a:rPr lang="en-GB" b="1" dirty="0">
-                <a:solidFill>
-                  <a:schemeClr val="tx1"/>
-                </a:solidFill>
-                <a:latin typeface="Courier New" pitchFamily="-106" charset="0"/>
-                <a:ea typeface="ＭＳ Ｐゴシック" pitchFamily="-106" charset="-128"/>
-                <a:cs typeface="Courier New" pitchFamily="-106" charset="0"/>
-              </a:rPr>
-              <a:t>="</a:t>
-            </a:r>
-            <a:r>
-              <a:rPr lang="en-GB" b="1" dirty="0">
-                <a:solidFill>
-                  <a:srgbClr val="00B050"/>
-                </a:solidFill>
-                <a:latin typeface="Courier New" pitchFamily="1" charset="0"/>
-              </a:rPr>
-              <a:t>/</a:t>
-            </a:r>
-            <a:r>
-              <a:rPr lang="en-GB" b="1" dirty="0" err="1">
-                <a:solidFill>
-                  <a:srgbClr val="00B050"/>
-                </a:solidFill>
-                <a:latin typeface="Courier New" pitchFamily="1" charset="0"/>
-              </a:rPr>
-              <a:t>socket.io</a:t>
-            </a:r>
-            <a:r>
-              <a:rPr lang="en-GB" b="1" dirty="0">
-                <a:solidFill>
-                  <a:srgbClr val="00B050"/>
-                </a:solidFill>
-                <a:latin typeface="Courier New" pitchFamily="1" charset="0"/>
-              </a:rPr>
-              <a:t>/</a:t>
-            </a:r>
-            <a:r>
-              <a:rPr lang="en-GB" b="1" dirty="0" err="1">
-                <a:solidFill>
-                  <a:srgbClr val="00B050"/>
-                </a:solidFill>
-                <a:latin typeface="Courier New" pitchFamily="1" charset="0"/>
-              </a:rPr>
-              <a:t>socket.io.js</a:t>
-            </a:r>
-            <a:r>
-              <a:rPr lang="en-GB" b="1" dirty="0">
-                <a:solidFill>
-                  <a:schemeClr val="tx1"/>
-                </a:solidFill>
-                <a:latin typeface="Courier New" pitchFamily="-106" charset="0"/>
-                <a:ea typeface="ＭＳ Ｐゴシック" pitchFamily="-106" charset="-128"/>
-                <a:cs typeface="Courier New" pitchFamily="-106" charset="0"/>
-              </a:rPr>
-              <a:t>"&gt;&lt;/</a:t>
-            </a:r>
-            <a:r>
-              <a:rPr lang="en-GB" b="1" dirty="0">
-                <a:solidFill>
-                  <a:schemeClr val="tx1"/>
-                </a:solidFill>
-                <a:latin typeface="Courier New" pitchFamily="-106" charset="0"/>
-                <a:ea typeface="ＭＳ Ｐゴシック" pitchFamily="-106" charset="-128"/>
-                <a:cs typeface="Courier New" pitchFamily="-106" charset="0"/>
-              </a:rPr>
-              <a:t>script</a:t>
-            </a:r>
-            <a:r>
-              <a:rPr lang="en-GB" b="1" dirty="0">
-                <a:solidFill>
-                  <a:schemeClr val="tx1"/>
-                </a:solidFill>
-                <a:latin typeface="Courier New" pitchFamily="-106" charset="0"/>
-                <a:ea typeface="ＭＳ Ｐゴシック" pitchFamily="-106" charset="-128"/>
-                <a:cs typeface="Courier New" pitchFamily="-106" charset="0"/>
-              </a:rPr>
-              <a:t>&gt;</a:t>
+              <a:t>"&gt;&lt;/script&gt;</a:t>
             </a:r>
           </a:p>
           <a:p>
@@ -25895,29 +26320,7 @@
                 <a:ea typeface="ＭＳ Ｐゴシック" pitchFamily="-106" charset="-128"/>
                 <a:cs typeface="Courier New" pitchFamily="-106" charset="0"/>
               </a:rPr>
-              <a:t>&lt;</a:t>
-            </a:r>
-            <a:r>
-              <a:rPr lang="en-GB" b="1" dirty="0">
-                <a:solidFill>
-                  <a:schemeClr val="tx1"/>
-                </a:solidFill>
-                <a:latin typeface="Courier New" pitchFamily="-106" charset="0"/>
-                <a:ea typeface="ＭＳ Ｐゴシック" pitchFamily="-106" charset="-128"/>
-                <a:cs typeface="Courier New" pitchFamily="-106" charset="0"/>
-              </a:rPr>
-              <a:t>script</a:t>
-            </a:r>
-            <a:r>
-              <a:rPr lang="en-GB" b="1" dirty="0">
-                <a:solidFill>
-                  <a:schemeClr val="tx1"/>
-                </a:solidFill>
-                <a:latin typeface="Courier New" pitchFamily="-106" charset="0"/>
-                <a:ea typeface="ＭＳ Ｐゴシック" pitchFamily="-106" charset="-128"/>
-                <a:cs typeface="Courier New" pitchFamily="-106" charset="0"/>
-              </a:rPr>
-              <a:t>&gt;</a:t>
+              <a:t>&lt;script&gt;</a:t>
             </a:r>
           </a:p>
           <a:p>
@@ -26242,14 +26645,6 @@
               </a:rPr>
               <a:t>&lt;/script&gt;</a:t>
             </a:r>
-            <a:endParaRPr lang="en-GB" b="1" dirty="0">
-              <a:solidFill>
-                <a:schemeClr val="tx1"/>
-              </a:solidFill>
-              <a:latin typeface="Courier New" pitchFamily="-106" charset="0"/>
-              <a:ea typeface="ＭＳ Ｐゴシック" pitchFamily="-106" charset="-128"/>
-              <a:cs typeface="Courier New" pitchFamily="-106" charset="0"/>
-            </a:endParaRPr>
           </a:p>
         </p:txBody>
       </p:sp>

</xml_diff>